<commit_message>
add a new slide
</commit_message>
<xml_diff>
--- a/pyramid.pptx
+++ b/pyramid.pptx
@@ -7,6 +7,7 @@
   <p:sldIdLst>
     <p:sldId id="256" r:id="rId2"/>
     <p:sldId id="257" r:id="rId3"/>
+    <p:sldId id="258" r:id="rId4"/>
   </p:sldIdLst>
   <p:sldSz cx="9144000" cy="6858000" type="screen4x3"/>
   <p:notesSz cx="6858000" cy="9144000"/>
@@ -1163,6 +1164,13 @@
         </dgm:presLayoutVars>
       </dgm:prSet>
       <dgm:spPr/>
+      <dgm:t>
+        <a:bodyPr/>
+        <a:lstStyle/>
+        <a:p>
+          <a:endParaRPr lang="en-US"/>
+        </a:p>
+      </dgm:t>
     </dgm:pt>
     <dgm:pt modelId="{F6D77061-3FBF-4FAD-9774-EF434B042749}" type="pres">
       <dgm:prSet presAssocID="{B0F87EF3-3908-4ABC-96C9-9E4270F8ACC9}" presName="levelTx" presStyleLbl="revTx" presStyleIdx="0" presStyleCnt="0">
@@ -1172,6 +1180,13 @@
         </dgm:presLayoutVars>
       </dgm:prSet>
       <dgm:spPr/>
+      <dgm:t>
+        <a:bodyPr/>
+        <a:lstStyle/>
+        <a:p>
+          <a:endParaRPr lang="en-US"/>
+        </a:p>
+      </dgm:t>
     </dgm:pt>
     <dgm:pt modelId="{4E400198-8E8A-40AD-B8B3-F963C6461231}" type="pres">
       <dgm:prSet presAssocID="{022506FC-8A16-43E8-A088-FD1994758A4F}" presName="Name8" presStyleCnt="0"/>
@@ -1229,6 +1244,13 @@
         </dgm:presLayoutVars>
       </dgm:prSet>
       <dgm:spPr/>
+      <dgm:t>
+        <a:bodyPr/>
+        <a:lstStyle/>
+        <a:p>
+          <a:endParaRPr lang="en-US"/>
+        </a:p>
+      </dgm:t>
     </dgm:pt>
     <dgm:pt modelId="{0A3DBBF3-04D0-4258-9146-D9D4FA769936}" type="pres">
       <dgm:prSet presAssocID="{BF2ED5D8-E29E-4886-A8A1-A6BF05F82777}" presName="levelTx" presStyleLbl="revTx" presStyleIdx="0" presStyleCnt="0">
@@ -1238,6 +1260,13 @@
         </dgm:presLayoutVars>
       </dgm:prSet>
       <dgm:spPr/>
+      <dgm:t>
+        <a:bodyPr/>
+        <a:lstStyle/>
+        <a:p>
+          <a:endParaRPr lang="en-US"/>
+        </a:p>
+      </dgm:t>
     </dgm:pt>
     <dgm:pt modelId="{6875E142-44F3-438E-BE16-91C329A80AB5}" type="pres">
       <dgm:prSet presAssocID="{89D116D0-1FFB-4FC3-A1CE-69F62E112FDB}" presName="Name8" presStyleCnt="0"/>
@@ -2888,6 +2917,7 @@
           <a:p>
             <a:fld id="{6E40DD74-2709-4ABD-8EE0-7F7B919176F2}" type="datetimeFigureOut">
               <a:rPr lang="en-US" smtClean="0"/>
+              <a:pPr/>
               <a:t>2/14/2016</a:t>
             </a:fld>
             <a:endParaRPr lang="en-US"/>
@@ -2930,6 +2960,7 @@
           <a:p>
             <a:fld id="{B59E1FF0-04A1-4753-8851-28631B60F167}" type="slidenum">
               <a:rPr lang="en-US" smtClean="0"/>
+              <a:pPr/>
               <a:t>‹#›</a:t>
             </a:fld>
             <a:endParaRPr lang="en-US"/>
@@ -3053,6 +3084,7 @@
           <a:p>
             <a:fld id="{6E40DD74-2709-4ABD-8EE0-7F7B919176F2}" type="datetimeFigureOut">
               <a:rPr lang="en-US" smtClean="0"/>
+              <a:pPr/>
               <a:t>2/14/2016</a:t>
             </a:fld>
             <a:endParaRPr lang="en-US"/>
@@ -3095,6 +3127,7 @@
           <a:p>
             <a:fld id="{B59E1FF0-04A1-4753-8851-28631B60F167}" type="slidenum">
               <a:rPr lang="en-US" smtClean="0"/>
+              <a:pPr/>
               <a:t>‹#›</a:t>
             </a:fld>
             <a:endParaRPr lang="en-US"/>
@@ -3228,6 +3261,7 @@
           <a:p>
             <a:fld id="{6E40DD74-2709-4ABD-8EE0-7F7B919176F2}" type="datetimeFigureOut">
               <a:rPr lang="en-US" smtClean="0"/>
+              <a:pPr/>
               <a:t>2/14/2016</a:t>
             </a:fld>
             <a:endParaRPr lang="en-US"/>
@@ -3270,6 +3304,7 @@
           <a:p>
             <a:fld id="{B59E1FF0-04A1-4753-8851-28631B60F167}" type="slidenum">
               <a:rPr lang="en-US" smtClean="0"/>
+              <a:pPr/>
               <a:t>‹#›</a:t>
             </a:fld>
             <a:endParaRPr lang="en-US"/>
@@ -3393,6 +3428,7 @@
           <a:p>
             <a:fld id="{6E40DD74-2709-4ABD-8EE0-7F7B919176F2}" type="datetimeFigureOut">
               <a:rPr lang="en-US" smtClean="0"/>
+              <a:pPr/>
               <a:t>2/14/2016</a:t>
             </a:fld>
             <a:endParaRPr lang="en-US"/>
@@ -3435,6 +3471,7 @@
           <a:p>
             <a:fld id="{B59E1FF0-04A1-4753-8851-28631B60F167}" type="slidenum">
               <a:rPr lang="en-US" smtClean="0"/>
+              <a:pPr/>
               <a:t>‹#›</a:t>
             </a:fld>
             <a:endParaRPr lang="en-US"/>
@@ -3634,6 +3671,7 @@
           <a:p>
             <a:fld id="{6E40DD74-2709-4ABD-8EE0-7F7B919176F2}" type="datetimeFigureOut">
               <a:rPr lang="en-US" smtClean="0"/>
+              <a:pPr/>
               <a:t>2/14/2016</a:t>
             </a:fld>
             <a:endParaRPr lang="en-US"/>
@@ -3676,6 +3714,7 @@
           <a:p>
             <a:fld id="{B59E1FF0-04A1-4753-8851-28631B60F167}" type="slidenum">
               <a:rPr lang="en-US" smtClean="0"/>
+              <a:pPr/>
               <a:t>‹#›</a:t>
             </a:fld>
             <a:endParaRPr lang="en-US"/>
@@ -3917,6 +3956,7 @@
           <a:p>
             <a:fld id="{6E40DD74-2709-4ABD-8EE0-7F7B919176F2}" type="datetimeFigureOut">
               <a:rPr lang="en-US" smtClean="0"/>
+              <a:pPr/>
               <a:t>2/14/2016</a:t>
             </a:fld>
             <a:endParaRPr lang="en-US"/>
@@ -3959,6 +3999,7 @@
           <a:p>
             <a:fld id="{B59E1FF0-04A1-4753-8851-28631B60F167}" type="slidenum">
               <a:rPr lang="en-US" smtClean="0"/>
+              <a:pPr/>
               <a:t>‹#›</a:t>
             </a:fld>
             <a:endParaRPr lang="en-US"/>
@@ -4334,6 +4375,7 @@
           <a:p>
             <a:fld id="{6E40DD74-2709-4ABD-8EE0-7F7B919176F2}" type="datetimeFigureOut">
               <a:rPr lang="en-US" smtClean="0"/>
+              <a:pPr/>
               <a:t>2/14/2016</a:t>
             </a:fld>
             <a:endParaRPr lang="en-US"/>
@@ -4376,6 +4418,7 @@
           <a:p>
             <a:fld id="{B59E1FF0-04A1-4753-8851-28631B60F167}" type="slidenum">
               <a:rPr lang="en-US" smtClean="0"/>
+              <a:pPr/>
               <a:t>‹#›</a:t>
             </a:fld>
             <a:endParaRPr lang="en-US"/>
@@ -4447,6 +4490,7 @@
           <a:p>
             <a:fld id="{6E40DD74-2709-4ABD-8EE0-7F7B919176F2}" type="datetimeFigureOut">
               <a:rPr lang="en-US" smtClean="0"/>
+              <a:pPr/>
               <a:t>2/14/2016</a:t>
             </a:fld>
             <a:endParaRPr lang="en-US"/>
@@ -4489,6 +4533,7 @@
           <a:p>
             <a:fld id="{B59E1FF0-04A1-4753-8851-28631B60F167}" type="slidenum">
               <a:rPr lang="en-US" smtClean="0"/>
+              <a:pPr/>
               <a:t>‹#›</a:t>
             </a:fld>
             <a:endParaRPr lang="en-US"/>
@@ -4537,6 +4582,7 @@
           <a:p>
             <a:fld id="{6E40DD74-2709-4ABD-8EE0-7F7B919176F2}" type="datetimeFigureOut">
               <a:rPr lang="en-US" smtClean="0"/>
+              <a:pPr/>
               <a:t>2/14/2016</a:t>
             </a:fld>
             <a:endParaRPr lang="en-US"/>
@@ -4579,6 +4625,7 @@
           <a:p>
             <a:fld id="{B59E1FF0-04A1-4753-8851-28631B60F167}" type="slidenum">
               <a:rPr lang="en-US" smtClean="0"/>
+              <a:pPr/>
               <a:t>‹#›</a:t>
             </a:fld>
             <a:endParaRPr lang="en-US"/>
@@ -4809,6 +4856,7 @@
           <a:p>
             <a:fld id="{6E40DD74-2709-4ABD-8EE0-7F7B919176F2}" type="datetimeFigureOut">
               <a:rPr lang="en-US" smtClean="0"/>
+              <a:pPr/>
               <a:t>2/14/2016</a:t>
             </a:fld>
             <a:endParaRPr lang="en-US"/>
@@ -4851,6 +4899,7 @@
           <a:p>
             <a:fld id="{B59E1FF0-04A1-4753-8851-28631B60F167}" type="slidenum">
               <a:rPr lang="en-US" smtClean="0"/>
+              <a:pPr/>
               <a:t>‹#›</a:t>
             </a:fld>
             <a:endParaRPr lang="en-US"/>
@@ -5057,6 +5106,7 @@
           <a:p>
             <a:fld id="{6E40DD74-2709-4ABD-8EE0-7F7B919176F2}" type="datetimeFigureOut">
               <a:rPr lang="en-US" smtClean="0"/>
+              <a:pPr/>
               <a:t>2/14/2016</a:t>
             </a:fld>
             <a:endParaRPr lang="en-US"/>
@@ -5099,6 +5149,7 @@
           <a:p>
             <a:fld id="{B59E1FF0-04A1-4753-8851-28631B60F167}" type="slidenum">
               <a:rPr lang="en-US" smtClean="0"/>
+              <a:pPr/>
               <a:t>‹#›</a:t>
             </a:fld>
             <a:endParaRPr lang="en-US"/>
@@ -5265,6 +5316,7 @@
           <a:p>
             <a:fld id="{6E40DD74-2709-4ABD-8EE0-7F7B919176F2}" type="datetimeFigureOut">
               <a:rPr lang="en-US" smtClean="0"/>
+              <a:pPr/>
               <a:t>2/14/2016</a:t>
             </a:fld>
             <a:endParaRPr lang="en-US"/>
@@ -5343,6 +5395,7 @@
           <a:p>
             <a:fld id="{B59E1FF0-04A1-4753-8851-28631B60F167}" type="slidenum">
               <a:rPr lang="en-US" smtClean="0"/>
+              <a:pPr/>
               <a:t>‹#›</a:t>
             </a:fld>
             <a:endParaRPr lang="en-US"/>
@@ -5752,6 +5805,73 @@
 </p:sld>
 </file>
 
+<file path=ppt/slides/slide3.xml><?xml version="1.0" encoding="utf-8"?>
+<p:sld xmlns:a="http://schemas.openxmlformats.org/drawingml/2006/main" xmlns:r="http://schemas.openxmlformats.org/officeDocument/2006/relationships" xmlns:p="http://schemas.openxmlformats.org/presentationml/2006/main">
+  <p:cSld>
+    <p:spTree>
+      <p:nvGrpSpPr>
+        <p:cNvPr id="1" name=""/>
+        <p:cNvGrpSpPr/>
+        <p:nvPr/>
+      </p:nvGrpSpPr>
+      <p:grpSpPr>
+        <a:xfrm>
+          <a:off x="0" y="0"/>
+          <a:ext cx="0" cy="0"/>
+          <a:chOff x="0" y="0"/>
+          <a:chExt cx="0" cy="0"/>
+        </a:xfrm>
+      </p:grpSpPr>
+      <p:sp>
+        <p:nvSpPr>
+          <p:cNvPr id="2" name="Title 1"/>
+          <p:cNvSpPr>
+            <a:spLocks noGrp="1"/>
+          </p:cNvSpPr>
+          <p:nvPr>
+            <p:ph type="title"/>
+          </p:nvPr>
+        </p:nvSpPr>
+        <p:spPr/>
+        <p:txBody>
+          <a:bodyPr/>
+          <a:lstStyle/>
+          <a:p>
+            <a:endParaRPr lang="en-US"/>
+          </a:p>
+        </p:txBody>
+      </p:sp>
+      <p:sp>
+        <p:nvSpPr>
+          <p:cNvPr id="3" name="Content Placeholder 2"/>
+          <p:cNvSpPr>
+            <a:spLocks noGrp="1"/>
+          </p:cNvSpPr>
+          <p:nvPr>
+            <p:ph idx="1"/>
+          </p:nvPr>
+        </p:nvSpPr>
+        <p:spPr/>
+        <p:txBody>
+          <a:bodyPr/>
+          <a:lstStyle/>
+          <a:p>
+            <a:r>
+              <a:rPr lang="en-US" smtClean="0"/>
+              <a:t>For test</a:t>
+            </a:r>
+            <a:endParaRPr lang="en-US"/>
+          </a:p>
+        </p:txBody>
+      </p:sp>
+    </p:spTree>
+  </p:cSld>
+  <p:clrMapOvr>
+    <a:masterClrMapping/>
+  </p:clrMapOvr>
+</p:sld>
+</file>
+
 <file path=ppt/theme/theme1.xml><?xml version="1.0" encoding="utf-8"?>
 <a:theme xmlns:a="http://schemas.openxmlformats.org/drawingml/2006/main" name="Office Theme">
   <a:themeElements>

</xml_diff>

<commit_message>
a bit changes in slide 2
</commit_message>
<xml_diff>
--- a/pyramid.pptx
+++ b/pyramid.pptx
@@ -5857,8 +5857,18 @@
           <a:lstStyle/>
           <a:p>
             <a:r>
-              <a:rPr lang="en-US" smtClean="0"/>
-              <a:t>For test</a:t>
+              <a:rPr lang="en-US" dirty="0" smtClean="0"/>
+              <a:t>For </a:t>
+            </a:r>
+            <a:r>
+              <a:rPr lang="en-US" dirty="0" smtClean="0"/>
+              <a:t>test</a:t>
+            </a:r>
+          </a:p>
+          <a:p>
+            <a:r>
+              <a:rPr lang="en-US" smtClean="0"/>
+              <a:t>test</a:t>
             </a:r>
             <a:endParaRPr lang="en-US"/>
           </a:p>

</xml_diff>